<commit_message>
update1 after review 1
</commit_message>
<xml_diff>
--- a/ppt and references/Main - PPT Template Ctech.pptx
+++ b/ppt and references/Main - PPT Template Ctech.pptx
@@ -311,7 +311,7 @@
       </p15:sldGuideLst>
     </p:ext>
     <p:ext uri="GoogleSlidesCustomDataVersion2">
-      <go:slidesCustomData xmlns="" xmlns:mc="http://schemas.openxmlformats.org/markup-compatibility/2006" xmlns:mv="urn:schemas-microsoft-com:mac:vml" xmlns:c="http://schemas.openxmlformats.org/drawingml/2006/chart" xmlns:dgm="http://schemas.openxmlformats.org/drawingml/2006/diagram" xmlns:o="urn:schemas-microsoft-com:office:office" xmlns:v="urn:schemas-microsoft-com:vml" xmlns:pvml="urn:schemas-microsoft-com:office:powerpoint" xmlns:com="http://schemas.openxmlformats.org/drawingml/2006/compatibility" xmlns:p14="http://schemas.microsoft.com/office/powerpoint/2010/main" xmlns:p15="http://schemas.microsoft.com/office/powerpoint/2012/main" xmlns:ahyp="http://schemas.microsoft.com/office/drawing/2018/hyperlinkcolor" xmlns:go="http://customooxmlschemas.google.com/" r:id="rId50" roundtripDataSignature="AMtx7mi7obY/PlCgr+gvvfKQS+9LuEpaCA=="/>
+      <go:slidesCustomData xmlns:go="http://customooxmlschemas.google.com/" xmlns:ahyp="http://schemas.microsoft.com/office/drawing/2018/hyperlinkcolor" xmlns:p15="http://schemas.microsoft.com/office/powerpoint/2012/main" xmlns:p14="http://schemas.microsoft.com/office/powerpoint/2010/main" xmlns:com="http://schemas.openxmlformats.org/drawingml/2006/compatibility" xmlns:pvml="urn:schemas-microsoft-com:office:powerpoint" xmlns:v="urn:schemas-microsoft-com:vml" xmlns:o="urn:schemas-microsoft-com:office:office" xmlns:dgm="http://schemas.openxmlformats.org/drawingml/2006/diagram" xmlns:c="http://schemas.openxmlformats.org/drawingml/2006/chart" xmlns:mv="urn:schemas-microsoft-com:mac:vml" xmlns:mc="http://schemas.openxmlformats.org/markup-compatibility/2006" xmlns="" r:id="rId50" roundtripDataSignature="AMtx7mi7obY/PlCgr+gvvfKQS+9LuEpaCA=="/>
     </p:ext>
   </p:extLst>
 </p:presentation>
@@ -20696,7 +20696,7 @@
         <p:spPr>
           <a:xfrm>
             <a:off x="457200" y="2306638"/>
-            <a:ext cx="8686800" cy="3709500"/>
+            <a:ext cx="8686800" cy="3750227"/>
           </a:xfrm>
           <a:prstGeom prst="rect">
             <a:avLst/>
@@ -20722,7 +20722,7 @@
               <a:buNone/>
             </a:pPr>
             <a:r>
-              <a:rPr lang="en-US" sz="1800">
+              <a:rPr lang="en-US" sz="1800" dirty="0">
                 <a:solidFill>
                   <a:srgbClr val="343541"/>
                 </a:solidFill>
@@ -20733,7 +20733,7 @@
               </a:rPr>
               <a:t>The project utilizes the following algorithms:</a:t>
             </a:r>
-            <a:endParaRPr sz="1800">
+            <a:endParaRPr sz="1800" dirty="0">
               <a:solidFill>
                 <a:srgbClr val="343541"/>
               </a:solidFill>
@@ -20753,7 +20753,7 @@
               </a:spcAft>
               <a:buNone/>
             </a:pPr>
-            <a:endParaRPr sz="1800">
+            <a:endParaRPr sz="1800" dirty="0">
               <a:solidFill>
                 <a:srgbClr val="343541"/>
               </a:solidFill>
@@ -20764,7 +20764,7 @@
             </a:endParaRPr>
           </a:p>
           <a:p>
-            <a:pPr marL="457200" lvl="0" indent="-355600" algn="just" rtl="0">
+            <a:pPr marL="101600" lvl="0" algn="just" rtl="0">
               <a:spcBef>
                 <a:spcPts val="0"/>
               </a:spcBef>
@@ -20775,11 +20775,9 @@
                 <a:srgbClr val="343541"/>
               </a:buClr>
               <a:buSzPts val="2000"/>
-              <a:buFont typeface="Times New Roman"/>
-              <a:buAutoNum type="arabicPeriod"/>
             </a:pPr>
             <a:r>
-              <a:rPr lang="en-US" sz="2000" b="1">
+              <a:rPr lang="en-US" sz="2000" b="1" dirty="0">
                 <a:solidFill>
                   <a:schemeClr val="dk1"/>
                 </a:solidFill>
@@ -20788,9 +20786,9 @@
                 <a:cs typeface="Times New Roman"/>
                 <a:sym typeface="Times New Roman"/>
               </a:rPr>
-              <a:t>Vectorization</a:t>
+              <a:t>1. 	Vectorization</a:t>
             </a:r>
-            <a:endParaRPr sz="2000" b="1">
+            <a:endParaRPr sz="2000" b="1" dirty="0">
               <a:solidFill>
                 <a:srgbClr val="343541"/>
               </a:solidFill>
@@ -20810,7 +20808,7 @@
               </a:spcAft>
               <a:buNone/>
             </a:pPr>
-            <a:endParaRPr sz="1800">
+            <a:endParaRPr sz="1800" dirty="0">
               <a:solidFill>
                 <a:srgbClr val="343541"/>
               </a:solidFill>
@@ -20831,7 +20829,7 @@
               <a:buNone/>
             </a:pPr>
             <a:r>
-              <a:rPr lang="en-US" sz="1800">
+              <a:rPr lang="en-US" sz="1800" dirty="0">
                 <a:solidFill>
                   <a:schemeClr val="dk1"/>
                 </a:solidFill>
@@ -20842,7 +20840,7 @@
               </a:rPr>
               <a:t>Vectorization is jargon for a classic approach of converting input data from its raw format (i.e. text ) into vectors of real numbers which is the format that ML models support. This approach has been there ever since computers were first built, it has worked wonderfully across various domains, and it’s now used in NLP. In Machine Learning, vectorization is a step in feature extraction. The idea is to get some distinct features out of the text for the model to train on, by converting text to numerical vectors.</a:t>
             </a:r>
-            <a:endParaRPr sz="1800">
+            <a:endParaRPr sz="1800" dirty="0">
               <a:solidFill>
                 <a:schemeClr val="dk1"/>
               </a:solidFill>
@@ -20862,7 +20860,7 @@
               </a:spcAft>
               <a:buNone/>
             </a:pPr>
-            <a:endParaRPr sz="1100">
+            <a:endParaRPr sz="1100" dirty="0">
               <a:solidFill>
                 <a:schemeClr val="dk1"/>
               </a:solidFill>
@@ -20883,7 +20881,7 @@
               <a:buNone/>
             </a:pPr>
             <a:r>
-              <a:rPr lang="en-US" sz="1800" u="sng">
+              <a:rPr lang="en-US" sz="1800" u="sng" dirty="0">
                 <a:solidFill>
                   <a:srgbClr val="0000FF"/>
                 </a:solidFill>
@@ -20894,7 +20892,7 @@
               </a:rPr>
               <a:t>https://neptune.ai/blog/vectorization-techniques-in-nlp-guide</a:t>
             </a:r>
-            <a:endParaRPr sz="1800" u="sng">
+            <a:endParaRPr sz="1800" u="sng" dirty="0">
               <a:solidFill>
                 <a:srgbClr val="0000FF"/>
               </a:solidFill>
@@ -20917,7 +20915,7 @@
               </a:spcAft>
               <a:buNone/>
             </a:pPr>
-            <a:endParaRPr sz="1800">
+            <a:endParaRPr sz="1800" dirty="0">
               <a:solidFill>
                 <a:srgbClr val="D1D5DB"/>
               </a:solidFill>
@@ -21224,7 +21222,7 @@
               <a:buNone/>
             </a:pPr>
             <a:r>
-              <a:rPr lang="en-US" sz="1800">
+              <a:rPr lang="en-US" sz="1800" dirty="0">
                 <a:solidFill>
                   <a:srgbClr val="343541"/>
                 </a:solidFill>
@@ -21235,7 +21233,7 @@
               </a:rPr>
               <a:t>The project utilizes the following algorithms:</a:t>
             </a:r>
-            <a:endParaRPr sz="1800">
+            <a:endParaRPr sz="1800" dirty="0">
               <a:solidFill>
                 <a:srgbClr val="343541"/>
               </a:solidFill>
@@ -21255,7 +21253,7 @@
               </a:spcAft>
               <a:buNone/>
             </a:pPr>
-            <a:endParaRPr sz="1800">
+            <a:endParaRPr sz="1800" dirty="0">
               <a:solidFill>
                 <a:srgbClr val="343541"/>
               </a:solidFill>
@@ -21276,7 +21274,7 @@
               <a:buNone/>
             </a:pPr>
             <a:r>
-              <a:rPr lang="en-US" sz="2000" b="1">
+              <a:rPr lang="en-US" sz="2000" b="1" dirty="0">
                 <a:solidFill>
                   <a:schemeClr val="dk1"/>
                 </a:solidFill>
@@ -21287,7 +21285,7 @@
               </a:rPr>
               <a:t>2.	Cosine Similarity</a:t>
             </a:r>
-            <a:endParaRPr sz="2000" b="1">
+            <a:endParaRPr sz="2000" b="1" dirty="0">
               <a:solidFill>
                 <a:srgbClr val="343541"/>
               </a:solidFill>
@@ -21307,7 +21305,7 @@
               </a:spcAft>
               <a:buNone/>
             </a:pPr>
-            <a:endParaRPr sz="1800">
+            <a:endParaRPr sz="1800" dirty="0">
               <a:solidFill>
                 <a:srgbClr val="343541"/>
               </a:solidFill>
@@ -21328,7 +21326,7 @@
               <a:buNone/>
             </a:pPr>
             <a:r>
-              <a:rPr lang="en-US" sz="1800">
+              <a:rPr lang="en-US" sz="1800" dirty="0">
                 <a:solidFill>
                   <a:schemeClr val="dk1"/>
                 </a:solidFill>
@@ -21339,7 +21337,7 @@
               </a:rPr>
               <a:t>After vectorizing the user's symptoms and a dataset of known symptoms (presumably from a medical database), the code calculates the cosine similarity between these vectors. Cosine similarity is often used to measure the similarity between two vectors in a high-dimensional space, such as text documents.</a:t>
             </a:r>
-            <a:endParaRPr sz="1800">
+            <a:endParaRPr sz="1800" dirty="0">
               <a:solidFill>
                 <a:schemeClr val="dk1"/>
               </a:solidFill>
@@ -21359,7 +21357,7 @@
               </a:spcAft>
               <a:buNone/>
             </a:pPr>
-            <a:endParaRPr sz="1800">
+            <a:endParaRPr sz="1800" dirty="0">
               <a:solidFill>
                 <a:schemeClr val="dk1"/>
               </a:solidFill>
@@ -21380,7 +21378,7 @@
               <a:buNone/>
             </a:pPr>
             <a:r>
-              <a:rPr lang="en-US" sz="1800" u="sng">
+              <a:rPr lang="en-US" sz="1800" u="sng" dirty="0">
                 <a:solidFill>
                   <a:schemeClr val="hlink"/>
                 </a:solidFill>
@@ -21392,7 +21390,7 @@
               </a:rPr>
               <a:t>https://www.sciencedirect.com/topics/computer-science/cosine-similarity</a:t>
             </a:r>
-            <a:endParaRPr sz="1800" u="sng">
+            <a:endParaRPr sz="1800" u="sng" dirty="0">
               <a:solidFill>
                 <a:srgbClr val="0000FF"/>
               </a:solidFill>
@@ -21415,7 +21413,7 @@
               </a:spcAft>
               <a:buNone/>
             </a:pPr>
-            <a:endParaRPr sz="1800">
+            <a:endParaRPr sz="1800" dirty="0">
               <a:solidFill>
                 <a:srgbClr val="D1D5DB"/>
               </a:solidFill>

</xml_diff>